<commit_message>
Arboles IF, IF-ELSE, DO-WHILE
</commit_message>
<xml_diff>
--- a/Arboles/For.pptx
+++ b/Arboles/For.pptx
@@ -156,7 +156,7 @@
           </a:lstStyle>
           <a:p>
             <a:r>
-              <a:rPr lang="es-ES" smtClean="0"/>
+              <a:rPr lang="es-ES"/>
               <a:t>Haga clic para modificar el estilo de título del patrón</a:t>
             </a:r>
             <a:endParaRPr lang="en-US"/>
@@ -221,7 +221,7 @@
           </a:lstStyle>
           <a:p>
             <a:r>
-              <a:rPr lang="es-ES" smtClean="0"/>
+              <a:rPr lang="es-ES"/>
               <a:t>Haga clic para editar el estilo de subtítulo del patrón</a:t>
             </a:r>
             <a:endParaRPr lang="en-US"/>
@@ -245,7 +245,7 @@
           <a:p>
             <a:fld id="{A24D1F3A-D1EF-447E-A819-3BB187B73454}" type="datetimeFigureOut">
               <a:rPr lang="en-US" smtClean="0"/>
-              <a:t>7/21/2022</a:t>
+              <a:t>7/23/2022</a:t>
             </a:fld>
             <a:endParaRPr lang="en-US"/>
           </a:p>
@@ -339,7 +339,7 @@
           <a:lstStyle/>
           <a:p>
             <a:r>
-              <a:rPr lang="es-ES" smtClean="0"/>
+              <a:rPr lang="es-ES"/>
               <a:t>Haga clic para modificar el estilo de título del patrón</a:t>
             </a:r>
             <a:endParaRPr lang="en-US"/>
@@ -363,35 +363,35 @@
           <a:p>
             <a:pPr lvl="0"/>
             <a:r>
-              <a:rPr lang="es-ES" smtClean="0"/>
+              <a:rPr lang="es-ES"/>
               <a:t>Editar el estilo de texto del patrón</a:t>
             </a:r>
           </a:p>
           <a:p>
             <a:pPr lvl="1"/>
             <a:r>
-              <a:rPr lang="es-ES" smtClean="0"/>
+              <a:rPr lang="es-ES"/>
               <a:t>Segundo nivel</a:t>
             </a:r>
           </a:p>
           <a:p>
             <a:pPr lvl="2"/>
             <a:r>
-              <a:rPr lang="es-ES" smtClean="0"/>
+              <a:rPr lang="es-ES"/>
               <a:t>Tercer nivel</a:t>
             </a:r>
           </a:p>
           <a:p>
             <a:pPr lvl="3"/>
             <a:r>
-              <a:rPr lang="es-ES" smtClean="0"/>
+              <a:rPr lang="es-ES"/>
               <a:t>Cuarto nivel</a:t>
             </a:r>
           </a:p>
           <a:p>
             <a:pPr lvl="4"/>
             <a:r>
-              <a:rPr lang="es-ES" smtClean="0"/>
+              <a:rPr lang="es-ES"/>
               <a:t>Quinto nivel</a:t>
             </a:r>
             <a:endParaRPr lang="en-US"/>
@@ -415,7 +415,7 @@
           <a:p>
             <a:fld id="{A24D1F3A-D1EF-447E-A819-3BB187B73454}" type="datetimeFigureOut">
               <a:rPr lang="en-US" smtClean="0"/>
-              <a:t>7/21/2022</a:t>
+              <a:t>7/23/2022</a:t>
             </a:fld>
             <a:endParaRPr lang="en-US"/>
           </a:p>
@@ -514,7 +514,7 @@
           <a:lstStyle/>
           <a:p>
             <a:r>
-              <a:rPr lang="es-ES" smtClean="0"/>
+              <a:rPr lang="es-ES"/>
               <a:t>Haga clic para modificar el estilo de título del patrón</a:t>
             </a:r>
             <a:endParaRPr lang="en-US"/>
@@ -543,35 +543,35 @@
           <a:p>
             <a:pPr lvl="0"/>
             <a:r>
-              <a:rPr lang="es-ES" smtClean="0"/>
+              <a:rPr lang="es-ES"/>
               <a:t>Editar el estilo de texto del patrón</a:t>
             </a:r>
           </a:p>
           <a:p>
             <a:pPr lvl="1"/>
             <a:r>
-              <a:rPr lang="es-ES" smtClean="0"/>
+              <a:rPr lang="es-ES"/>
               <a:t>Segundo nivel</a:t>
             </a:r>
           </a:p>
           <a:p>
             <a:pPr lvl="2"/>
             <a:r>
-              <a:rPr lang="es-ES" smtClean="0"/>
+              <a:rPr lang="es-ES"/>
               <a:t>Tercer nivel</a:t>
             </a:r>
           </a:p>
           <a:p>
             <a:pPr lvl="3"/>
             <a:r>
-              <a:rPr lang="es-ES" smtClean="0"/>
+              <a:rPr lang="es-ES"/>
               <a:t>Cuarto nivel</a:t>
             </a:r>
           </a:p>
           <a:p>
             <a:pPr lvl="4"/>
             <a:r>
-              <a:rPr lang="es-ES" smtClean="0"/>
+              <a:rPr lang="es-ES"/>
               <a:t>Quinto nivel</a:t>
             </a:r>
             <a:endParaRPr lang="en-US"/>
@@ -595,7 +595,7 @@
           <a:p>
             <a:fld id="{A24D1F3A-D1EF-447E-A819-3BB187B73454}" type="datetimeFigureOut">
               <a:rPr lang="en-US" smtClean="0"/>
-              <a:t>7/21/2022</a:t>
+              <a:t>7/23/2022</a:t>
             </a:fld>
             <a:endParaRPr lang="en-US"/>
           </a:p>
@@ -689,7 +689,7 @@
           <a:lstStyle/>
           <a:p>
             <a:r>
-              <a:rPr lang="es-ES" smtClean="0"/>
+              <a:rPr lang="es-ES"/>
               <a:t>Haga clic para modificar el estilo de título del patrón</a:t>
             </a:r>
             <a:endParaRPr lang="en-US"/>
@@ -713,35 +713,35 @@
           <a:p>
             <a:pPr lvl="0"/>
             <a:r>
-              <a:rPr lang="es-ES" smtClean="0"/>
+              <a:rPr lang="es-ES"/>
               <a:t>Editar el estilo de texto del patrón</a:t>
             </a:r>
           </a:p>
           <a:p>
             <a:pPr lvl="1"/>
             <a:r>
-              <a:rPr lang="es-ES" smtClean="0"/>
+              <a:rPr lang="es-ES"/>
               <a:t>Segundo nivel</a:t>
             </a:r>
           </a:p>
           <a:p>
             <a:pPr lvl="2"/>
             <a:r>
-              <a:rPr lang="es-ES" smtClean="0"/>
+              <a:rPr lang="es-ES"/>
               <a:t>Tercer nivel</a:t>
             </a:r>
           </a:p>
           <a:p>
             <a:pPr lvl="3"/>
             <a:r>
-              <a:rPr lang="es-ES" smtClean="0"/>
+              <a:rPr lang="es-ES"/>
               <a:t>Cuarto nivel</a:t>
             </a:r>
           </a:p>
           <a:p>
             <a:pPr lvl="4"/>
             <a:r>
-              <a:rPr lang="es-ES" smtClean="0"/>
+              <a:rPr lang="es-ES"/>
               <a:t>Quinto nivel</a:t>
             </a:r>
             <a:endParaRPr lang="en-US"/>
@@ -765,7 +765,7 @@
           <a:p>
             <a:fld id="{A24D1F3A-D1EF-447E-A819-3BB187B73454}" type="datetimeFigureOut">
               <a:rPr lang="en-US" smtClean="0"/>
-              <a:t>7/21/2022</a:t>
+              <a:t>7/23/2022</a:t>
             </a:fld>
             <a:endParaRPr lang="en-US"/>
           </a:p>
@@ -868,7 +868,7 @@
           </a:lstStyle>
           <a:p>
             <a:r>
-              <a:rPr lang="es-ES" smtClean="0"/>
+              <a:rPr lang="es-ES"/>
               <a:t>Haga clic para modificar el estilo de título del patrón</a:t>
             </a:r>
             <a:endParaRPr lang="en-US"/>
@@ -988,7 +988,7 @@
           <a:p>
             <a:pPr lvl="0"/>
             <a:r>
-              <a:rPr lang="es-ES" smtClean="0"/>
+              <a:rPr lang="es-ES"/>
               <a:t>Editar el estilo de texto del patrón</a:t>
             </a:r>
           </a:p>
@@ -1011,7 +1011,7 @@
           <a:p>
             <a:fld id="{A24D1F3A-D1EF-447E-A819-3BB187B73454}" type="datetimeFigureOut">
               <a:rPr lang="en-US" smtClean="0"/>
-              <a:t>7/21/2022</a:t>
+              <a:t>7/23/2022</a:t>
             </a:fld>
             <a:endParaRPr lang="en-US"/>
           </a:p>
@@ -1105,7 +1105,7 @@
           <a:lstStyle/>
           <a:p>
             <a:r>
-              <a:rPr lang="es-ES" smtClean="0"/>
+              <a:rPr lang="es-ES"/>
               <a:t>Haga clic para modificar el estilo de título del patrón</a:t>
             </a:r>
             <a:endParaRPr lang="en-US"/>
@@ -1134,35 +1134,35 @@
           <a:p>
             <a:pPr lvl="0"/>
             <a:r>
-              <a:rPr lang="es-ES" smtClean="0"/>
+              <a:rPr lang="es-ES"/>
               <a:t>Editar el estilo de texto del patrón</a:t>
             </a:r>
           </a:p>
           <a:p>
             <a:pPr lvl="1"/>
             <a:r>
-              <a:rPr lang="es-ES" smtClean="0"/>
+              <a:rPr lang="es-ES"/>
               <a:t>Segundo nivel</a:t>
             </a:r>
           </a:p>
           <a:p>
             <a:pPr lvl="2"/>
             <a:r>
-              <a:rPr lang="es-ES" smtClean="0"/>
+              <a:rPr lang="es-ES"/>
               <a:t>Tercer nivel</a:t>
             </a:r>
           </a:p>
           <a:p>
             <a:pPr lvl="3"/>
             <a:r>
-              <a:rPr lang="es-ES" smtClean="0"/>
+              <a:rPr lang="es-ES"/>
               <a:t>Cuarto nivel</a:t>
             </a:r>
           </a:p>
           <a:p>
             <a:pPr lvl="4"/>
             <a:r>
-              <a:rPr lang="es-ES" smtClean="0"/>
+              <a:rPr lang="es-ES"/>
               <a:t>Quinto nivel</a:t>
             </a:r>
             <a:endParaRPr lang="en-US"/>
@@ -1191,35 +1191,35 @@
           <a:p>
             <a:pPr lvl="0"/>
             <a:r>
-              <a:rPr lang="es-ES" smtClean="0"/>
+              <a:rPr lang="es-ES"/>
               <a:t>Editar el estilo de texto del patrón</a:t>
             </a:r>
           </a:p>
           <a:p>
             <a:pPr lvl="1"/>
             <a:r>
-              <a:rPr lang="es-ES" smtClean="0"/>
+              <a:rPr lang="es-ES"/>
               <a:t>Segundo nivel</a:t>
             </a:r>
           </a:p>
           <a:p>
             <a:pPr lvl="2"/>
             <a:r>
-              <a:rPr lang="es-ES" smtClean="0"/>
+              <a:rPr lang="es-ES"/>
               <a:t>Tercer nivel</a:t>
             </a:r>
           </a:p>
           <a:p>
             <a:pPr lvl="3"/>
             <a:r>
-              <a:rPr lang="es-ES" smtClean="0"/>
+              <a:rPr lang="es-ES"/>
               <a:t>Cuarto nivel</a:t>
             </a:r>
           </a:p>
           <a:p>
             <a:pPr lvl="4"/>
             <a:r>
-              <a:rPr lang="es-ES" smtClean="0"/>
+              <a:rPr lang="es-ES"/>
               <a:t>Quinto nivel</a:t>
             </a:r>
             <a:endParaRPr lang="en-US"/>
@@ -1243,7 +1243,7 @@
           <a:p>
             <a:fld id="{A24D1F3A-D1EF-447E-A819-3BB187B73454}" type="datetimeFigureOut">
               <a:rPr lang="en-US" smtClean="0"/>
-              <a:t>7/21/2022</a:t>
+              <a:t>7/23/2022</a:t>
             </a:fld>
             <a:endParaRPr lang="en-US"/>
           </a:p>
@@ -1342,7 +1342,7 @@
           <a:lstStyle/>
           <a:p>
             <a:r>
-              <a:rPr lang="es-ES" smtClean="0"/>
+              <a:rPr lang="es-ES"/>
               <a:t>Haga clic para modificar el estilo de título del patrón</a:t>
             </a:r>
             <a:endParaRPr lang="en-US"/>
@@ -1408,7 +1408,7 @@
           <a:p>
             <a:pPr lvl="0"/>
             <a:r>
-              <a:rPr lang="es-ES" smtClean="0"/>
+              <a:rPr lang="es-ES"/>
               <a:t>Editar el estilo de texto del patrón</a:t>
             </a:r>
           </a:p>
@@ -1436,35 +1436,35 @@
           <a:p>
             <a:pPr lvl="0"/>
             <a:r>
-              <a:rPr lang="es-ES" smtClean="0"/>
+              <a:rPr lang="es-ES"/>
               <a:t>Editar el estilo de texto del patrón</a:t>
             </a:r>
           </a:p>
           <a:p>
             <a:pPr lvl="1"/>
             <a:r>
-              <a:rPr lang="es-ES" smtClean="0"/>
+              <a:rPr lang="es-ES"/>
               <a:t>Segundo nivel</a:t>
             </a:r>
           </a:p>
           <a:p>
             <a:pPr lvl="2"/>
             <a:r>
-              <a:rPr lang="es-ES" smtClean="0"/>
+              <a:rPr lang="es-ES"/>
               <a:t>Tercer nivel</a:t>
             </a:r>
           </a:p>
           <a:p>
             <a:pPr lvl="3"/>
             <a:r>
-              <a:rPr lang="es-ES" smtClean="0"/>
+              <a:rPr lang="es-ES"/>
               <a:t>Cuarto nivel</a:t>
             </a:r>
           </a:p>
           <a:p>
             <a:pPr lvl="4"/>
             <a:r>
-              <a:rPr lang="es-ES" smtClean="0"/>
+              <a:rPr lang="es-ES"/>
               <a:t>Quinto nivel</a:t>
             </a:r>
             <a:endParaRPr lang="en-US"/>
@@ -1530,7 +1530,7 @@
           <a:p>
             <a:pPr lvl="0"/>
             <a:r>
-              <a:rPr lang="es-ES" smtClean="0"/>
+              <a:rPr lang="es-ES"/>
               <a:t>Editar el estilo de texto del patrón</a:t>
             </a:r>
           </a:p>
@@ -1558,35 +1558,35 @@
           <a:p>
             <a:pPr lvl="0"/>
             <a:r>
-              <a:rPr lang="es-ES" smtClean="0"/>
+              <a:rPr lang="es-ES"/>
               <a:t>Editar el estilo de texto del patrón</a:t>
             </a:r>
           </a:p>
           <a:p>
             <a:pPr lvl="1"/>
             <a:r>
-              <a:rPr lang="es-ES" smtClean="0"/>
+              <a:rPr lang="es-ES"/>
               <a:t>Segundo nivel</a:t>
             </a:r>
           </a:p>
           <a:p>
             <a:pPr lvl="2"/>
             <a:r>
-              <a:rPr lang="es-ES" smtClean="0"/>
+              <a:rPr lang="es-ES"/>
               <a:t>Tercer nivel</a:t>
             </a:r>
           </a:p>
           <a:p>
             <a:pPr lvl="3"/>
             <a:r>
-              <a:rPr lang="es-ES" smtClean="0"/>
+              <a:rPr lang="es-ES"/>
               <a:t>Cuarto nivel</a:t>
             </a:r>
           </a:p>
           <a:p>
             <a:pPr lvl="4"/>
             <a:r>
-              <a:rPr lang="es-ES" smtClean="0"/>
+              <a:rPr lang="es-ES"/>
               <a:t>Quinto nivel</a:t>
             </a:r>
             <a:endParaRPr lang="en-US"/>
@@ -1610,7 +1610,7 @@
           <a:p>
             <a:fld id="{A24D1F3A-D1EF-447E-A819-3BB187B73454}" type="datetimeFigureOut">
               <a:rPr lang="en-US" smtClean="0"/>
-              <a:t>7/21/2022</a:t>
+              <a:t>7/23/2022</a:t>
             </a:fld>
             <a:endParaRPr lang="en-US"/>
           </a:p>
@@ -1704,7 +1704,7 @@
           <a:lstStyle/>
           <a:p>
             <a:r>
-              <a:rPr lang="es-ES" smtClean="0"/>
+              <a:rPr lang="es-ES"/>
               <a:t>Haga clic para modificar el estilo de título del patrón</a:t>
             </a:r>
             <a:endParaRPr lang="en-US"/>
@@ -1728,7 +1728,7 @@
           <a:p>
             <a:fld id="{A24D1F3A-D1EF-447E-A819-3BB187B73454}" type="datetimeFigureOut">
               <a:rPr lang="en-US" smtClean="0"/>
-              <a:t>7/21/2022</a:t>
+              <a:t>7/23/2022</a:t>
             </a:fld>
             <a:endParaRPr lang="en-US"/>
           </a:p>
@@ -1823,7 +1823,7 @@
           <a:p>
             <a:fld id="{A24D1F3A-D1EF-447E-A819-3BB187B73454}" type="datetimeFigureOut">
               <a:rPr lang="en-US" smtClean="0"/>
-              <a:t>7/21/2022</a:t>
+              <a:t>7/23/2022</a:t>
             </a:fld>
             <a:endParaRPr lang="en-US"/>
           </a:p>
@@ -1926,7 +1926,7 @@
           </a:lstStyle>
           <a:p>
             <a:r>
-              <a:rPr lang="es-ES" smtClean="0"/>
+              <a:rPr lang="es-ES"/>
               <a:t>Haga clic para modificar el estilo de título del patrón</a:t>
             </a:r>
             <a:endParaRPr lang="en-US"/>
@@ -1983,35 +1983,35 @@
           <a:p>
             <a:pPr lvl="0"/>
             <a:r>
-              <a:rPr lang="es-ES" smtClean="0"/>
+              <a:rPr lang="es-ES"/>
               <a:t>Editar el estilo de texto del patrón</a:t>
             </a:r>
           </a:p>
           <a:p>
             <a:pPr lvl="1"/>
             <a:r>
-              <a:rPr lang="es-ES" smtClean="0"/>
+              <a:rPr lang="es-ES"/>
               <a:t>Segundo nivel</a:t>
             </a:r>
           </a:p>
           <a:p>
             <a:pPr lvl="2"/>
             <a:r>
-              <a:rPr lang="es-ES" smtClean="0"/>
+              <a:rPr lang="es-ES"/>
               <a:t>Tercer nivel</a:t>
             </a:r>
           </a:p>
           <a:p>
             <a:pPr lvl="3"/>
             <a:r>
-              <a:rPr lang="es-ES" smtClean="0"/>
+              <a:rPr lang="es-ES"/>
               <a:t>Cuarto nivel</a:t>
             </a:r>
           </a:p>
           <a:p>
             <a:pPr lvl="4"/>
             <a:r>
-              <a:rPr lang="es-ES" smtClean="0"/>
+              <a:rPr lang="es-ES"/>
               <a:t>Quinto nivel</a:t>
             </a:r>
             <a:endParaRPr lang="en-US"/>
@@ -2077,7 +2077,7 @@
           <a:p>
             <a:pPr lvl="0"/>
             <a:r>
-              <a:rPr lang="es-ES" smtClean="0"/>
+              <a:rPr lang="es-ES"/>
               <a:t>Editar el estilo de texto del patrón</a:t>
             </a:r>
           </a:p>
@@ -2100,7 +2100,7 @@
           <a:p>
             <a:fld id="{A24D1F3A-D1EF-447E-A819-3BB187B73454}" type="datetimeFigureOut">
               <a:rPr lang="en-US" smtClean="0"/>
-              <a:t>7/21/2022</a:t>
+              <a:t>7/23/2022</a:t>
             </a:fld>
             <a:endParaRPr lang="en-US"/>
           </a:p>
@@ -2203,7 +2203,7 @@
           </a:lstStyle>
           <a:p>
             <a:r>
-              <a:rPr lang="es-ES" smtClean="0"/>
+              <a:rPr lang="es-ES"/>
               <a:t>Haga clic para modificar el estilo de título del patrón</a:t>
             </a:r>
             <a:endParaRPr lang="en-US"/>
@@ -2330,7 +2330,7 @@
           <a:p>
             <a:pPr lvl="0"/>
             <a:r>
-              <a:rPr lang="es-ES" smtClean="0"/>
+              <a:rPr lang="es-ES"/>
               <a:t>Editar el estilo de texto del patrón</a:t>
             </a:r>
           </a:p>
@@ -2353,7 +2353,7 @@
           <a:p>
             <a:fld id="{A24D1F3A-D1EF-447E-A819-3BB187B73454}" type="datetimeFigureOut">
               <a:rPr lang="en-US" smtClean="0"/>
-              <a:t>7/21/2022</a:t>
+              <a:t>7/23/2022</a:t>
             </a:fld>
             <a:endParaRPr lang="en-US"/>
           </a:p>
@@ -2462,7 +2462,7 @@
           <a:lstStyle/>
           <a:p>
             <a:r>
-              <a:rPr lang="es-ES" smtClean="0"/>
+              <a:rPr lang="es-ES"/>
               <a:t>Haga clic para modificar el estilo de título del patrón</a:t>
             </a:r>
             <a:endParaRPr lang="en-US"/>
@@ -2496,35 +2496,35 @@
           <a:p>
             <a:pPr lvl="0"/>
             <a:r>
-              <a:rPr lang="es-ES" smtClean="0"/>
+              <a:rPr lang="es-ES"/>
               <a:t>Editar el estilo de texto del patrón</a:t>
             </a:r>
           </a:p>
           <a:p>
             <a:pPr lvl="1"/>
             <a:r>
-              <a:rPr lang="es-ES" smtClean="0"/>
+              <a:rPr lang="es-ES"/>
               <a:t>Segundo nivel</a:t>
             </a:r>
           </a:p>
           <a:p>
             <a:pPr lvl="2"/>
             <a:r>
-              <a:rPr lang="es-ES" smtClean="0"/>
+              <a:rPr lang="es-ES"/>
               <a:t>Tercer nivel</a:t>
             </a:r>
           </a:p>
           <a:p>
             <a:pPr lvl="3"/>
             <a:r>
-              <a:rPr lang="es-ES" smtClean="0"/>
+              <a:rPr lang="es-ES"/>
               <a:t>Cuarto nivel</a:t>
             </a:r>
           </a:p>
           <a:p>
             <a:pPr lvl="4"/>
             <a:r>
-              <a:rPr lang="es-ES" smtClean="0"/>
+              <a:rPr lang="es-ES"/>
               <a:t>Quinto nivel</a:t>
             </a:r>
             <a:endParaRPr lang="en-US"/>
@@ -2566,7 +2566,7 @@
           <a:p>
             <a:fld id="{A24D1F3A-D1EF-447E-A819-3BB187B73454}" type="datetimeFigureOut">
               <a:rPr lang="en-US" smtClean="0"/>
-              <a:t>7/21/2022</a:t>
+              <a:t>7/23/2022</a:t>
             </a:fld>
             <a:endParaRPr lang="en-US"/>
           </a:p>
@@ -2995,7 +2995,7 @@
           <a:p>
             <a:pPr algn="ctr"/>
             <a:r>
-              <a:rPr lang="es-ES" sz="7200" b="1" cap="none" spc="0" dirty="0" smtClean="0">
+              <a:rPr lang="es-ES" sz="7200" b="1" cap="none" spc="0" dirty="0">
                 <a:ln w="12700">
                   <a:solidFill>
                     <a:schemeClr val="tx2">
@@ -3029,7 +3029,7 @@
           <a:p>
             <a:pPr algn="ctr"/>
             <a:r>
-              <a:rPr lang="es-ES" sz="7200" b="1" dirty="0" smtClean="0">
+              <a:rPr lang="es-ES" sz="7200" b="1" dirty="0">
                 <a:ln w="12700">
                   <a:solidFill>
                     <a:schemeClr val="tx2">
@@ -3170,7 +3170,7 @@
           <a:lstStyle/>
           <a:p>
             <a:r>
-              <a:rPr lang="es-ES" dirty="0" smtClean="0"/>
+              <a:rPr lang="es-ES" dirty="0"/>
               <a:t>FOR</a:t>
             </a:r>
             <a:endParaRPr lang="en-US" dirty="0"/>
@@ -3200,7 +3200,7 @@
           <a:lstStyle/>
           <a:p>
             <a:r>
-              <a:rPr lang="es-ES" dirty="0" err="1" smtClean="0"/>
+              <a:rPr lang="es-ES" dirty="0" err="1"/>
               <a:t>For</a:t>
             </a:r>
             <a:endParaRPr lang="en-US" dirty="0"/>
@@ -3230,7 +3230,7 @@
           <a:lstStyle/>
           <a:p>
             <a:r>
-              <a:rPr lang="es-ES" dirty="0" smtClean="0"/>
+              <a:rPr lang="es-ES" dirty="0"/>
               <a:t>(</a:t>
             </a:r>
             <a:endParaRPr lang="en-US" dirty="0"/>
@@ -3260,7 +3260,7 @@
           <a:lstStyle/>
           <a:p>
             <a:r>
-              <a:rPr lang="es-ES" dirty="0" smtClean="0"/>
+              <a:rPr lang="es-ES" dirty="0"/>
               <a:t>FOR_PARTE_UNO</a:t>
             </a:r>
             <a:endParaRPr lang="en-US" dirty="0"/>
@@ -3320,7 +3320,7 @@
           <a:lstStyle/>
           <a:p>
             <a:r>
-              <a:rPr lang="es-ES" dirty="0" smtClean="0"/>
+              <a:rPr lang="es-ES" dirty="0"/>
               <a:t>SENTENCIA</a:t>
             </a:r>
             <a:endParaRPr lang="en-US" dirty="0"/>
@@ -3350,7 +3350,7 @@
           <a:lstStyle/>
           <a:p>
             <a:r>
-              <a:rPr lang="es-ES" dirty="0" smtClean="0"/>
+              <a:rPr lang="es-ES" dirty="0"/>
               <a:t>SENTENCIA_BOOLENA_ANIDADA</a:t>
             </a:r>
             <a:endParaRPr lang="en-US" dirty="0"/>
@@ -3380,7 +3380,7 @@
           <a:lstStyle/>
           <a:p>
             <a:r>
-              <a:rPr lang="es-ES" dirty="0" smtClean="0"/>
+              <a:rPr lang="es-ES" dirty="0"/>
               <a:t>}</a:t>
             </a:r>
             <a:endParaRPr lang="en-US" dirty="0"/>
@@ -3440,7 +3440,7 @@
           <a:lstStyle/>
           <a:p>
             <a:r>
-              <a:rPr lang="es-ES" dirty="0" smtClean="0"/>
+              <a:rPr lang="es-ES" dirty="0"/>
               <a:t>OPERACIONES_COMPLEMENTARIAS</a:t>
             </a:r>
             <a:endParaRPr lang="en-US" dirty="0"/>
@@ -3470,7 +3470,7 @@
           <a:lstStyle/>
           <a:p>
             <a:r>
-              <a:rPr lang="es-ES" dirty="0" smtClean="0"/>
+              <a:rPr lang="es-ES" dirty="0"/>
               <a:t>)</a:t>
             </a:r>
             <a:endParaRPr lang="en-US" dirty="0"/>
@@ -3893,7 +3893,7 @@
           <a:lstStyle/>
           <a:p>
             <a:r>
-              <a:rPr lang="es-ES" dirty="0" err="1" smtClean="0"/>
+              <a:rPr lang="es-ES" dirty="0" err="1"/>
               <a:t>Int</a:t>
             </a:r>
             <a:endParaRPr lang="en-US" dirty="0"/>
@@ -3953,7 +3953,7 @@
           <a:lstStyle/>
           <a:p>
             <a:r>
-              <a:rPr lang="es-ES" dirty="0" smtClean="0"/>
+              <a:rPr lang="es-ES" dirty="0"/>
               <a:t>i</a:t>
             </a:r>
             <a:endParaRPr lang="en-US" dirty="0"/>
@@ -4013,7 +4013,7 @@
           <a:lstStyle/>
           <a:p>
             <a:r>
-              <a:rPr lang="es-ES" dirty="0" smtClean="0"/>
+              <a:rPr lang="es-ES" dirty="0"/>
               <a:t>0</a:t>
             </a:r>
             <a:endParaRPr lang="en-US" dirty="0"/>
@@ -4195,10 +4195,9 @@
           <a:lstStyle/>
           <a:p>
             <a:r>
-              <a:rPr lang="en-US" dirty="0" smtClean="0"/>
+              <a:rPr lang="en-US" dirty="0"/>
               <a:t>SENTENCIA_BOOLEANA_COMPUESTA</a:t>
             </a:r>
-            <a:endParaRPr lang="en-US" dirty="0"/>
           </a:p>
         </p:txBody>
       </p:sp>
@@ -4224,10 +4223,9 @@
           <a:lstStyle/>
           <a:p>
             <a:r>
-              <a:rPr lang="en-US" dirty="0" smtClean="0"/>
+              <a:rPr lang="en-US" dirty="0"/>
               <a:t>IDENTIFICADORES</a:t>
             </a:r>
-            <a:endParaRPr lang="en-US" dirty="0"/>
           </a:p>
         </p:txBody>
       </p:sp>
@@ -4253,7 +4251,7 @@
           <a:lstStyle/>
           <a:p>
             <a:r>
-              <a:rPr lang="es-ES" dirty="0" smtClean="0"/>
+              <a:rPr lang="es-ES" dirty="0"/>
               <a:t>++</a:t>
             </a:r>
             <a:endParaRPr lang="en-US" dirty="0"/>
@@ -4282,7 +4280,7 @@
           <a:lstStyle/>
           <a:p>
             <a:r>
-              <a:rPr lang="es-ES" dirty="0" smtClean="0"/>
+              <a:rPr lang="es-ES" dirty="0"/>
               <a:t>COUT</a:t>
             </a:r>
             <a:endParaRPr lang="en-US" dirty="0"/>
@@ -4500,7 +4498,6 @@
               <a:rPr lang="en-US" dirty="0"/>
               <a:t>SENTENCIA_BOOLEANA_SIMPLE</a:t>
             </a:r>
-            <a:endParaRPr lang="en-US" dirty="0"/>
           </a:p>
         </p:txBody>
       </p:sp>
@@ -4530,7 +4527,6 @@
               <a:rPr lang="en-US" dirty="0"/>
               <a:t>SENTENCIA_BOOLEANA_SIMPLE</a:t>
             </a:r>
-            <a:endParaRPr lang="en-US" dirty="0"/>
           </a:p>
         </p:txBody>
       </p:sp>
@@ -4557,7 +4553,7 @@
           <a:lstStyle/>
           <a:p>
             <a:r>
-              <a:rPr lang="es-ES" dirty="0" smtClean="0"/>
+              <a:rPr lang="es-ES" dirty="0"/>
               <a:t>OPERADOR_RELACIONAL</a:t>
             </a:r>
             <a:endParaRPr lang="en-US" dirty="0"/>
@@ -4700,10 +4696,9 @@
           <a:lstStyle/>
           <a:p>
             <a:r>
-              <a:rPr lang="en-US" dirty="0" smtClean="0"/>
+              <a:rPr lang="en-US" dirty="0"/>
               <a:t>SALIDA</a:t>
             </a:r>
-            <a:endParaRPr lang="en-US" dirty="0"/>
           </a:p>
         </p:txBody>
       </p:sp>
@@ -4729,10 +4724,9 @@
           <a:lstStyle/>
           <a:p>
             <a:r>
-              <a:rPr lang="en-US" dirty="0" smtClean="0"/>
+              <a:rPr lang="en-US" dirty="0"/>
               <a:t>;</a:t>
             </a:r>
-            <a:endParaRPr lang="en-US" dirty="0"/>
           </a:p>
         </p:txBody>
       </p:sp>
@@ -4758,7 +4752,7 @@
           <a:lstStyle/>
           <a:p>
             <a:r>
-              <a:rPr lang="en-US" dirty="0" err="1" smtClean="0"/>
+              <a:rPr lang="en-US" dirty="0" err="1"/>
               <a:t>Cout</a:t>
             </a:r>
             <a:endParaRPr lang="en-US" dirty="0"/>
@@ -4787,10 +4781,9 @@
           <a:lstStyle/>
           <a:p>
             <a:r>
-              <a:rPr lang="en-US" dirty="0" smtClean="0"/>
+              <a:rPr lang="en-US" dirty="0"/>
               <a:t>&lt;&lt;</a:t>
             </a:r>
-            <a:endParaRPr lang="en-US" dirty="0"/>
           </a:p>
         </p:txBody>
       </p:sp>
@@ -4997,7 +4990,7 @@
           <a:lstStyle/>
           <a:p>
             <a:r>
-              <a:rPr lang="es-ES" dirty="0" smtClean="0"/>
+              <a:rPr lang="es-ES" dirty="0"/>
               <a:t>&lt;=</a:t>
             </a:r>
             <a:endParaRPr lang="en-US" dirty="0"/>
@@ -5027,7 +5020,7 @@
           <a:lstStyle/>
           <a:p>
             <a:r>
-              <a:rPr lang="es-ES" dirty="0" smtClean="0"/>
+              <a:rPr lang="es-ES" dirty="0"/>
               <a:t>22</a:t>
             </a:r>
             <a:endParaRPr lang="en-US" dirty="0"/>
@@ -5056,10 +5049,9 @@
           <a:lstStyle/>
           <a:p>
             <a:r>
-              <a:rPr lang="en-US" dirty="0" smtClean="0"/>
+              <a:rPr lang="en-US" dirty="0"/>
               <a:t>SALIDA</a:t>
             </a:r>
-            <a:endParaRPr lang="en-US" dirty="0"/>
           </a:p>
         </p:txBody>
       </p:sp>
@@ -5085,10 +5077,9 @@
           <a:lstStyle/>
           <a:p>
             <a:r>
-              <a:rPr lang="en-US" dirty="0" smtClean="0"/>
+              <a:rPr lang="en-US" dirty="0"/>
               <a:t>&lt;&lt;</a:t>
             </a:r>
-            <a:endParaRPr lang="en-US" dirty="0"/>
           </a:p>
         </p:txBody>
       </p:sp>
@@ -5115,7 +5106,7 @@
           <a:lstStyle/>
           <a:p>
             <a:r>
-              <a:rPr lang="es-ES" dirty="0" smtClean="0"/>
+              <a:rPr lang="es-ES" dirty="0"/>
               <a:t>”</a:t>
             </a:r>
             <a:endParaRPr lang="en-US" dirty="0"/>
@@ -5145,7 +5136,7 @@
           <a:lstStyle/>
           <a:p>
             <a:r>
-              <a:rPr lang="es-ES" dirty="0" smtClean="0"/>
+              <a:rPr lang="es-ES" dirty="0"/>
               <a:t>“</a:t>
             </a:r>
             <a:endParaRPr lang="en-US" dirty="0"/>
@@ -5175,17 +5166,12 @@
           <a:p>
             <a:r>
               <a:rPr lang="en-US" dirty="0" err="1"/>
-              <a:t>i</a:t>
-            </a:r>
-            <a:r>
-              <a:rPr lang="en-US" dirty="0" err="1" smtClean="0"/>
-              <a:t>teracion</a:t>
-            </a:r>
-            <a:r>
-              <a:rPr lang="en-US" dirty="0" smtClean="0"/>
+              <a:t>iteracion</a:t>
+            </a:r>
+            <a:r>
+              <a:rPr lang="en-US" dirty="0"/>
               <a:t>=</a:t>
             </a:r>
-            <a:endParaRPr lang="en-US" dirty="0"/>
           </a:p>
         </p:txBody>
       </p:sp>
@@ -5606,10 +5592,9 @@
           <a:lstStyle/>
           <a:p>
             <a:r>
-              <a:rPr lang="en-US" dirty="0" smtClean="0"/>
+              <a:rPr lang="en-US" dirty="0"/>
               <a:t>SALIDA</a:t>
             </a:r>
-            <a:endParaRPr lang="en-US" dirty="0"/>
           </a:p>
         </p:txBody>
       </p:sp>
@@ -5635,10 +5620,9 @@
           <a:lstStyle/>
           <a:p>
             <a:r>
-              <a:rPr lang="en-US" dirty="0" smtClean="0"/>
+              <a:rPr lang="en-US" dirty="0"/>
               <a:t>&lt;&lt;</a:t>
             </a:r>
-            <a:endParaRPr lang="en-US" dirty="0"/>
           </a:p>
         </p:txBody>
       </p:sp>
@@ -5664,7 +5648,7 @@
           <a:lstStyle/>
           <a:p>
             <a:r>
-              <a:rPr lang="es-ES" dirty="0" smtClean="0"/>
+              <a:rPr lang="es-ES" dirty="0"/>
               <a:t>IDENTIFICADORES</a:t>
             </a:r>
             <a:endParaRPr lang="en-US" dirty="0"/>
@@ -5963,7 +5947,7 @@
           <a:lstStyle/>
           <a:p>
             <a:r>
-              <a:rPr lang="es-ES" dirty="0" err="1" smtClean="0"/>
+              <a:rPr lang="es-ES" dirty="0" err="1"/>
               <a:t>Endl</a:t>
             </a:r>
             <a:endParaRPr lang="en-US" dirty="0"/>

</xml_diff>